<commit_message>
algorithm and brute force for different discount rates
</commit_message>
<xml_diff>
--- a/results and plots/Presentation1.pptx
+++ b/results and plots/Presentation1.pptx
@@ -272,7 +272,7 @@
           <a:p>
             <a:fld id="{7E7ECEF8-20CD-4468-A5E5-CDF973CB3EBF}" type="datetimeFigureOut">
               <a:rPr lang="en-DE" smtClean="0"/>
-              <a:t>19/06/2023</a:t>
+              <a:t>21/06/2023</a:t>
             </a:fld>
             <a:endParaRPr lang="en-DE"/>
           </a:p>
@@ -472,7 +472,7 @@
           <a:p>
             <a:fld id="{7E7ECEF8-20CD-4468-A5E5-CDF973CB3EBF}" type="datetimeFigureOut">
               <a:rPr lang="en-DE" smtClean="0"/>
-              <a:t>19/06/2023</a:t>
+              <a:t>21/06/2023</a:t>
             </a:fld>
             <a:endParaRPr lang="en-DE"/>
           </a:p>
@@ -682,7 +682,7 @@
           <a:p>
             <a:fld id="{7E7ECEF8-20CD-4468-A5E5-CDF973CB3EBF}" type="datetimeFigureOut">
               <a:rPr lang="en-DE" smtClean="0"/>
-              <a:t>19/06/2023</a:t>
+              <a:t>21/06/2023</a:t>
             </a:fld>
             <a:endParaRPr lang="en-DE"/>
           </a:p>
@@ -882,7 +882,7 @@
           <a:p>
             <a:fld id="{7E7ECEF8-20CD-4468-A5E5-CDF973CB3EBF}" type="datetimeFigureOut">
               <a:rPr lang="en-DE" smtClean="0"/>
-              <a:t>19/06/2023</a:t>
+              <a:t>21/06/2023</a:t>
             </a:fld>
             <a:endParaRPr lang="en-DE"/>
           </a:p>
@@ -1158,7 +1158,7 @@
           <a:p>
             <a:fld id="{7E7ECEF8-20CD-4468-A5E5-CDF973CB3EBF}" type="datetimeFigureOut">
               <a:rPr lang="en-DE" smtClean="0"/>
-              <a:t>19/06/2023</a:t>
+              <a:t>21/06/2023</a:t>
             </a:fld>
             <a:endParaRPr lang="en-DE"/>
           </a:p>
@@ -1426,7 +1426,7 @@
           <a:p>
             <a:fld id="{7E7ECEF8-20CD-4468-A5E5-CDF973CB3EBF}" type="datetimeFigureOut">
               <a:rPr lang="en-DE" smtClean="0"/>
-              <a:t>19/06/2023</a:t>
+              <a:t>21/06/2023</a:t>
             </a:fld>
             <a:endParaRPr lang="en-DE"/>
           </a:p>
@@ -1841,7 +1841,7 @@
           <a:p>
             <a:fld id="{7E7ECEF8-20CD-4468-A5E5-CDF973CB3EBF}" type="datetimeFigureOut">
               <a:rPr lang="en-DE" smtClean="0"/>
-              <a:t>19/06/2023</a:t>
+              <a:t>21/06/2023</a:t>
             </a:fld>
             <a:endParaRPr lang="en-DE"/>
           </a:p>
@@ -1983,7 +1983,7 @@
           <a:p>
             <a:fld id="{7E7ECEF8-20CD-4468-A5E5-CDF973CB3EBF}" type="datetimeFigureOut">
               <a:rPr lang="en-DE" smtClean="0"/>
-              <a:t>19/06/2023</a:t>
+              <a:t>21/06/2023</a:t>
             </a:fld>
             <a:endParaRPr lang="en-DE"/>
           </a:p>
@@ -2096,7 +2096,7 @@
           <a:p>
             <a:fld id="{7E7ECEF8-20CD-4468-A5E5-CDF973CB3EBF}" type="datetimeFigureOut">
               <a:rPr lang="en-DE" smtClean="0"/>
-              <a:t>19/06/2023</a:t>
+              <a:t>21/06/2023</a:t>
             </a:fld>
             <a:endParaRPr lang="en-DE"/>
           </a:p>
@@ -2409,7 +2409,7 @@
           <a:p>
             <a:fld id="{7E7ECEF8-20CD-4468-A5E5-CDF973CB3EBF}" type="datetimeFigureOut">
               <a:rPr lang="en-DE" smtClean="0"/>
-              <a:t>19/06/2023</a:t>
+              <a:t>21/06/2023</a:t>
             </a:fld>
             <a:endParaRPr lang="en-DE"/>
           </a:p>
@@ -2698,7 +2698,7 @@
           <a:p>
             <a:fld id="{7E7ECEF8-20CD-4468-A5E5-CDF973CB3EBF}" type="datetimeFigureOut">
               <a:rPr lang="en-DE" smtClean="0"/>
-              <a:t>19/06/2023</a:t>
+              <a:t>21/06/2023</a:t>
             </a:fld>
             <a:endParaRPr lang="en-DE"/>
           </a:p>
@@ -2941,7 +2941,7 @@
           <a:p>
             <a:fld id="{7E7ECEF8-20CD-4468-A5E5-CDF973CB3EBF}" type="datetimeFigureOut">
               <a:rPr lang="en-DE" smtClean="0"/>
-              <a:t>19/06/2023</a:t>
+              <a:t>21/06/2023</a:t>
             </a:fld>
             <a:endParaRPr lang="en-DE"/>
           </a:p>

</xml_diff>